<commit_message>
Auto commit - 2025-06-10 11:34:07.10
</commit_message>
<xml_diff>
--- a/실습 결과 - NOVA Cross Skilling 실습 결과물 제출 v1.1_강현구.pptx
+++ b/실습 결과 - NOVA Cross Skilling 실습 결과물 제출 v1.1_강현구.pptx
@@ -5302,6 +5302,30 @@
           </a:p>
         </p:txBody>
       </p:sp>
+      <p:pic>
+        <p:nvPicPr>
+          <p:cNvPr id="8" name="그림 7"/>
+          <p:cNvPicPr>
+            <a:picLocks noChangeAspect="1"/>
+          </p:cNvPicPr>
+          <p:nvPr/>
+        </p:nvPicPr>
+        <p:blipFill>
+          <a:blip r:embed="rId2"/>
+          <a:stretch>
+            <a:fillRect/>
+          </a:stretch>
+        </p:blipFill>
+        <p:spPr>
+          <a:xfrm>
+            <a:off x="762000" y="1761104"/>
+            <a:ext cx="10439400" cy="4966317"/>
+          </a:xfrm>
+          <a:prstGeom prst="rect">
+            <a:avLst/>
+          </a:prstGeom>
+        </p:spPr>
+      </p:pic>
     </p:spTree>
     <p:extLst>
       <p:ext uri="{BB962C8B-B14F-4D97-AF65-F5344CB8AC3E}">

</xml_diff>

<commit_message>
Auto commit - 2025-06-10 16:13:23.82
</commit_message>
<xml_diff>
--- a/실습 결과 - NOVA Cross Skilling 실습 결과물 제출 v1.1_강현구.pptx
+++ b/실습 결과 - NOVA Cross Skilling 실습 결과물 제출 v1.1_강현구.pptx
@@ -5595,6 +5595,30 @@
           </a:p>
         </p:txBody>
       </p:sp>
+      <p:pic>
+        <p:nvPicPr>
+          <p:cNvPr id="7" name="그림 6"/>
+          <p:cNvPicPr>
+            <a:picLocks noChangeAspect="1"/>
+          </p:cNvPicPr>
+          <p:nvPr/>
+        </p:nvPicPr>
+        <p:blipFill>
+          <a:blip r:embed="rId2"/>
+          <a:stretch>
+            <a:fillRect/>
+          </a:stretch>
+        </p:blipFill>
+        <p:spPr>
+          <a:xfrm>
+            <a:off x="1096744" y="1441148"/>
+            <a:ext cx="10000343" cy="5416852"/>
+          </a:xfrm>
+          <a:prstGeom prst="rect">
+            <a:avLst/>
+          </a:prstGeom>
+        </p:spPr>
+      </p:pic>
     </p:spTree>
     <p:extLst>
       <p:ext uri="{BB962C8B-B14F-4D97-AF65-F5344CB8AC3E}">

</xml_diff>

<commit_message>
Auto commit - 2025-06-10 18:07:13.82
</commit_message>
<xml_diff>
--- a/실습 결과 - NOVA Cross Skilling 실습 결과물 제출 v1.1_강현구.pptx
+++ b/실습 결과 - NOVA Cross Skilling 실습 결과물 제출 v1.1_강현구.pptx
@@ -5920,6 +5920,30 @@
           </a:p>
         </p:txBody>
       </p:sp>
+      <p:pic>
+        <p:nvPicPr>
+          <p:cNvPr id="3" name="그림 2"/>
+          <p:cNvPicPr>
+            <a:picLocks noChangeAspect="1"/>
+          </p:cNvPicPr>
+          <p:nvPr/>
+        </p:nvPicPr>
+        <p:blipFill>
+          <a:blip r:embed="rId2"/>
+          <a:stretch>
+            <a:fillRect/>
+          </a:stretch>
+        </p:blipFill>
+        <p:spPr>
+          <a:xfrm>
+            <a:off x="1870508" y="2283985"/>
+            <a:ext cx="7715250" cy="4179094"/>
+          </a:xfrm>
+          <a:prstGeom prst="rect">
+            <a:avLst/>
+          </a:prstGeom>
+        </p:spPr>
+      </p:pic>
     </p:spTree>
     <p:extLst>
       <p:ext uri="{BB962C8B-B14F-4D97-AF65-F5344CB8AC3E}">

</xml_diff>